<commit_message>
changes in PhD/Postdoc hiring process
</commit_message>
<xml_diff>
--- a/book/some_content/HR/Hiring/PhDPostDocs/Appendices/OverviewImage.pptx
+++ b/book/some_content/HR/Hiring/PhDPostDocs/Appendices/OverviewImage.pptx
@@ -11303,7 +11303,7 @@
           <p:nvPr>
             <p:extLst>
               <p:ext uri="{D42A27DB-BD31-4B8C-83A1-F6EECF244321}">
-                <p14:modId xmlns:p14="http://schemas.microsoft.com/office/powerpoint/2010/main" val="743318368"/>
+                <p14:modId xmlns:p14="http://schemas.microsoft.com/office/powerpoint/2010/main" val="4293796230"/>
               </p:ext>
             </p:extLst>
           </p:nvPr>
@@ -14665,18 +14665,7 @@
                             </a:schemeClr>
                           </a:solidFill>
                         </a:rPr>
-                        <a:t>See checklist first workday</a:t>
-                      </a:r>
-                      <a:r>
-                        <a:rPr lang="en-GB" sz="1200" baseline="30000" dirty="0">
-                          <a:solidFill>
-                            <a:schemeClr val="tx1">
-                              <a:lumMod val="75000"/>
-                              <a:lumOff val="25000"/>
-                            </a:schemeClr>
-                          </a:solidFill>
-                        </a:rPr>
-                        <a:t>4</a:t>
+                        <a:t>See checklist first workday in step 4.2</a:t>
                       </a:r>
                       <a:endParaRPr lang="en-NL" sz="1200" dirty="0">
                         <a:solidFill>
@@ -17099,26 +17088,6 @@
 </file>
 
 <file path=customXml/item1.xml><?xml version="1.0" encoding="utf-8"?>
-<p:properties xmlns:p="http://schemas.microsoft.com/office/2006/metadata/properties" xmlns:xsi="http://www.w3.org/2001/XMLSchema-instance" xmlns:pc="http://schemas.microsoft.com/office/infopath/2007/PartnerControls">
-  <documentManagement>
-    <lcf76f155ced4ddcb4097134ff3c332f xmlns="955c2ef9-e3fb-4d4b-8470-fb567c871aae">
-      <Terms xmlns="http://schemas.microsoft.com/office/infopath/2007/PartnerControls"/>
-    </lcf76f155ced4ddcb4097134ff3c332f>
-    <TaxCatchAll xmlns="0fb6041c-3b17-4400-a9d6-ff6e89203659" xsi:nil="true"/>
-  </documentManagement>
-</p:properties>
-</file>
-
-<file path=customXml/item2.xml><?xml version="1.0" encoding="utf-8"?>
-<?mso-contentType ?>
-<FormTemplates xmlns="http://schemas.microsoft.com/sharepoint/v3/contenttype/forms">
-  <Display>DocumentLibraryForm</Display>
-  <Edit>DocumentLibraryForm</Edit>
-  <New>DocumentLibraryForm</New>
-</FormTemplates>
-</file>
-
-<file path=customXml/item3.xml><?xml version="1.0" encoding="utf-8"?>
 <ct:contentTypeSchema xmlns:ct="http://schemas.microsoft.com/office/2006/metadata/contentType" xmlns:ma="http://schemas.microsoft.com/office/2006/metadata/properties/metaAttributes" ct:_="" ma:_="" ma:contentTypeName="Document" ma:contentTypeID="0x010100E5356C4E2CAF444A88BBC36C63A2A282" ma:contentTypeVersion="13" ma:contentTypeDescription="Create a new document." ma:contentTypeScope="" ma:versionID="1024606420dd1c907fe67ef48e2601a2">
   <xsd:schema xmlns:xsd="http://www.w3.org/2001/XMLSchema" xmlns:xs="http://www.w3.org/2001/XMLSchema" xmlns:p="http://schemas.microsoft.com/office/2006/metadata/properties" xmlns:ns2="955c2ef9-e3fb-4d4b-8470-fb567c871aae" xmlns:ns3="0fb6041c-3b17-4400-a9d6-ff6e89203659" targetNamespace="http://schemas.microsoft.com/office/2006/metadata/properties" ma:root="true" ma:fieldsID="d144fcb58d56967691e3ce2c3957191a" ns2:_="" ns3:_="">
     <xsd:import namespace="955c2ef9-e3fb-4d4b-8470-fb567c871aae"/>
@@ -17341,26 +17310,27 @@
 </ct:contentTypeSchema>
 </file>
 
-<file path=customXml/itemProps1.xml><?xml version="1.0" encoding="utf-8"?>
-<ds:datastoreItem xmlns:ds="http://schemas.openxmlformats.org/officeDocument/2006/customXml" ds:itemID="{6E8B63B3-C738-43B6-8C5B-4BE83CEC42E5}">
-  <ds:schemaRefs>
-    <ds:schemaRef ds:uri="http://schemas.microsoft.com/office/2006/metadata/properties"/>
-    <ds:schemaRef ds:uri="http://schemas.microsoft.com/office/infopath/2007/PartnerControls"/>
-    <ds:schemaRef ds:uri="955c2ef9-e3fb-4d4b-8470-fb567c871aae"/>
-    <ds:schemaRef ds:uri="0fb6041c-3b17-4400-a9d6-ff6e89203659"/>
-  </ds:schemaRefs>
-</ds:datastoreItem>
+<file path=customXml/item2.xml><?xml version="1.0" encoding="utf-8"?>
+<?mso-contentType ?>
+<FormTemplates xmlns="http://schemas.microsoft.com/sharepoint/v3/contenttype/forms">
+  <Display>DocumentLibraryForm</Display>
+  <Edit>DocumentLibraryForm</Edit>
+  <New>DocumentLibraryForm</New>
+</FormTemplates>
 </file>
 
-<file path=customXml/itemProps2.xml><?xml version="1.0" encoding="utf-8"?>
-<ds:datastoreItem xmlns:ds="http://schemas.openxmlformats.org/officeDocument/2006/customXml" ds:itemID="{00F351C5-3C6A-482F-BB25-1EA498FD4753}">
-  <ds:schemaRefs>
-    <ds:schemaRef ds:uri="http://schemas.microsoft.com/sharepoint/v3/contenttype/forms"/>
-  </ds:schemaRefs>
-</ds:datastoreItem>
+<file path=customXml/item3.xml><?xml version="1.0" encoding="utf-8"?>
+<p:properties xmlns:p="http://schemas.microsoft.com/office/2006/metadata/properties" xmlns:xsi="http://www.w3.org/2001/XMLSchema-instance" xmlns:pc="http://schemas.microsoft.com/office/infopath/2007/PartnerControls">
+  <documentManagement>
+    <lcf76f155ced4ddcb4097134ff3c332f xmlns="955c2ef9-e3fb-4d4b-8470-fb567c871aae">
+      <Terms xmlns="http://schemas.microsoft.com/office/infopath/2007/PartnerControls"/>
+    </lcf76f155ced4ddcb4097134ff3c332f>
+    <TaxCatchAll xmlns="0fb6041c-3b17-4400-a9d6-ff6e89203659" xsi:nil="true"/>
+  </documentManagement>
+</p:properties>
 </file>
 
-<file path=customXml/itemProps3.xml><?xml version="1.0" encoding="utf-8"?>
+<file path=customXml/itemProps1.xml><?xml version="1.0" encoding="utf-8"?>
 <ds:datastoreItem xmlns:ds="http://schemas.openxmlformats.org/officeDocument/2006/customXml" ds:itemID="{93D67912-E908-485C-BEBD-6517B6DEE35D}">
   <ds:schemaRefs>
     <ds:schemaRef ds:uri="http://schemas.microsoft.com/office/2006/metadata/contentType"/>
@@ -17377,4 +17347,23 @@
     <ds:schemaRef ds:uri="http://schemas.microsoft.com/internal/obd"/>
   </ds:schemaRefs>
 </ds:datastoreItem>
+</file>
+
+<file path=customXml/itemProps2.xml><?xml version="1.0" encoding="utf-8"?>
+<ds:datastoreItem xmlns:ds="http://schemas.openxmlformats.org/officeDocument/2006/customXml" ds:itemID="{00F351C5-3C6A-482F-BB25-1EA498FD4753}">
+  <ds:schemaRefs>
+    <ds:schemaRef ds:uri="http://schemas.microsoft.com/sharepoint/v3/contenttype/forms"/>
+  </ds:schemaRefs>
+</ds:datastoreItem>
+</file>
+
+<file path=customXml/itemProps3.xml><?xml version="1.0" encoding="utf-8"?>
+<ds:datastoreItem xmlns:ds="http://schemas.openxmlformats.org/officeDocument/2006/customXml" ds:itemID="{6E8B63B3-C738-43B6-8C5B-4BE83CEC42E5}">
+  <ds:schemaRefs>
+    <ds:schemaRef ds:uri="http://schemas.microsoft.com/office/2006/metadata/properties"/>
+    <ds:schemaRef ds:uri="http://schemas.microsoft.com/office/infopath/2007/PartnerControls"/>
+    <ds:schemaRef ds:uri="955c2ef9-e3fb-4d4b-8470-fb567c871aae"/>
+    <ds:schemaRef ds:uri="0fb6041c-3b17-4400-a9d6-ff6e89203659"/>
+  </ds:schemaRefs>
+</ds:datastoreItem>
 </file>
</xml_diff>